<commit_message>
power point workflow slides updated
</commit_message>
<xml_diff>
--- a/Workflow.pptx
+++ b/Workflow.pptx
@@ -6,7 +6,8 @@
   </p:sldMasterIdLst>
   <p:sldIdLst>
     <p:sldId id="257" r:id="rId2"/>
-    <p:sldId id="256" r:id="rId3"/>
+    <p:sldId id="258" r:id="rId3"/>
+    <p:sldId id="256" r:id="rId4"/>
   </p:sldIdLst>
   <p:sldSz cx="9144000" cy="6858000" type="screen4x3"/>
   <p:notesSz cx="6858000" cy="9144000"/>
@@ -3284,7 +3285,7 @@
       </p:grpSpPr>
       <p:pic>
         <p:nvPicPr>
-          <p:cNvPr id="4" name="Picture 3" descr="Presenter:Judge Names.png"/>
+          <p:cNvPr id="2" name="Picture 1" descr="Presentation List.png"/>
           <p:cNvPicPr>
             <a:picLocks noChangeAspect="1"/>
           </p:cNvPicPr>
@@ -3304,14 +3305,172 @@
         </p:blipFill>
         <p:spPr>
           <a:xfrm>
-            <a:off x="371124" y="0"/>
-            <a:ext cx="3393636" cy="3350629"/>
+            <a:off x="-634967" y="0"/>
+            <a:ext cx="4183316" cy="4130301"/>
           </a:xfrm>
           <a:prstGeom prst="rect">
             <a:avLst/>
           </a:prstGeom>
         </p:spPr>
       </p:pic>
+      <p:pic>
+        <p:nvPicPr>
+          <p:cNvPr id="3" name="Picture 2" descr="Email Process.png"/>
+          <p:cNvPicPr>
+            <a:picLocks noChangeAspect="1"/>
+          </p:cNvPicPr>
+          <p:nvPr/>
+        </p:nvPicPr>
+        <p:blipFill>
+          <a:blip r:embed="rId3">
+            <a:extLst>
+              <a:ext uri="{28A0092B-C50C-407E-A947-70E740481C1C}">
+                <a14:useLocalDpi xmlns:a14="http://schemas.microsoft.com/office/drawing/2010/main" val="0"/>
+              </a:ext>
+            </a:extLst>
+          </a:blip>
+          <a:stretch>
+            <a:fillRect/>
+          </a:stretch>
+        </p:blipFill>
+        <p:spPr>
+          <a:xfrm>
+            <a:off x="2765834" y="186740"/>
+            <a:ext cx="3770597" cy="4171862"/>
+          </a:xfrm>
+          <a:prstGeom prst="rect">
+            <a:avLst/>
+          </a:prstGeom>
+        </p:spPr>
+      </p:pic>
+      <p:cxnSp>
+        <p:nvCxnSpPr>
+          <p:cNvPr id="5" name="Straight Arrow Connector 4"/>
+          <p:cNvCxnSpPr/>
+          <p:nvPr/>
+        </p:nvCxnSpPr>
+        <p:spPr>
+          <a:xfrm flipV="1">
+            <a:off x="2297089" y="1755349"/>
+            <a:ext cx="1438015" cy="56022"/>
+          </a:xfrm>
+          <a:prstGeom prst="straightConnector1">
+            <a:avLst/>
+          </a:prstGeom>
+          <a:ln>
+            <a:tailEnd type="arrow"/>
+          </a:ln>
+        </p:spPr>
+        <p:style>
+          <a:lnRef idx="2">
+            <a:schemeClr val="accent1"/>
+          </a:lnRef>
+          <a:fillRef idx="0">
+            <a:schemeClr val="accent1"/>
+          </a:fillRef>
+          <a:effectRef idx="1">
+            <a:schemeClr val="accent1"/>
+          </a:effectRef>
+          <a:fontRef idx="minor">
+            <a:schemeClr val="tx1"/>
+          </a:fontRef>
+        </p:style>
+      </p:cxnSp>
+      <p:cxnSp>
+        <p:nvCxnSpPr>
+          <p:cNvPr id="6" name="Straight Arrow Connector 5"/>
+          <p:cNvCxnSpPr/>
+          <p:nvPr/>
+        </p:nvCxnSpPr>
+        <p:spPr>
+          <a:xfrm>
+            <a:off x="1327819" y="4002592"/>
+            <a:ext cx="0" cy="1285493"/>
+          </a:xfrm>
+          <a:prstGeom prst="straightConnector1">
+            <a:avLst/>
+          </a:prstGeom>
+          <a:ln>
+            <a:tailEnd type="arrow"/>
+          </a:ln>
+        </p:spPr>
+        <p:style>
+          <a:lnRef idx="2">
+            <a:schemeClr val="accent1"/>
+          </a:lnRef>
+          <a:fillRef idx="0">
+            <a:schemeClr val="accent1"/>
+          </a:fillRef>
+          <a:effectRef idx="1">
+            <a:schemeClr val="accent1"/>
+          </a:effectRef>
+          <a:fontRef idx="minor">
+            <a:schemeClr val="tx1"/>
+          </a:fontRef>
+        </p:style>
+      </p:cxnSp>
+      <p:sp>
+        <p:nvSpPr>
+          <p:cNvPr id="8" name="TextBox 7"/>
+          <p:cNvSpPr txBox="1"/>
+          <p:nvPr/>
+        </p:nvSpPr>
+        <p:spPr>
+          <a:xfrm>
+            <a:off x="562123" y="5521773"/>
+            <a:ext cx="2431450" cy="646331"/>
+          </a:xfrm>
+          <a:prstGeom prst="rect">
+            <a:avLst/>
+          </a:prstGeom>
+          <a:noFill/>
+        </p:spPr>
+        <p:txBody>
+          <a:bodyPr wrap="none" rtlCol="0">
+            <a:spAutoFit/>
+          </a:bodyPr>
+          <a:lstStyle/>
+          <a:p>
+            <a:r>
+              <a:rPr lang="en-US" dirty="0" smtClean="0"/>
+              <a:t>To Presentation Judging</a:t>
+            </a:r>
+          </a:p>
+          <a:p>
+            <a:endParaRPr lang="en-US" dirty="0"/>
+          </a:p>
+        </p:txBody>
+      </p:sp>
+    </p:spTree>
+    <p:extLst>
+      <p:ext uri="{BB962C8B-B14F-4D97-AF65-F5344CB8AC3E}">
+        <p14:creationId xmlns:p14="http://schemas.microsoft.com/office/powerpoint/2010/main" val="4172417012"/>
+      </p:ext>
+    </p:extLst>
+  </p:cSld>
+  <p:clrMapOvr>
+    <a:masterClrMapping/>
+  </p:clrMapOvr>
+</p:sld>
+</file>
+
+<file path=ppt/slides/slide3.xml><?xml version="1.0" encoding="utf-8"?>
+<p:sld xmlns:a="http://schemas.openxmlformats.org/drawingml/2006/main" xmlns:r="http://schemas.openxmlformats.org/officeDocument/2006/relationships" xmlns:p="http://schemas.openxmlformats.org/presentationml/2006/main">
+  <p:cSld>
+    <p:spTree>
+      <p:nvGrpSpPr>
+        <p:cNvPr id="1" name=""/>
+        <p:cNvGrpSpPr/>
+        <p:nvPr/>
+      </p:nvGrpSpPr>
+      <p:grpSpPr>
+        <a:xfrm>
+          <a:off x="0" y="0"/>
+          <a:ext cx="0" cy="0"/>
+          <a:chOff x="0" y="0"/>
+          <a:chExt cx="0" cy="0"/>
+        </a:xfrm>
+      </p:grpSpPr>
       <p:pic>
         <p:nvPicPr>
           <p:cNvPr id="5" name="Picture 4" descr="Select Section.png"/>
@@ -3321,7 +3480,7 @@
           <p:nvPr/>
         </p:nvPicPr>
         <p:blipFill>
-          <a:blip r:embed="rId3">
+          <a:blip r:embed="rId2">
             <a:extLst>
               <a:ext uri="{28A0092B-C50C-407E-A947-70E740481C1C}">
                 <a14:useLocalDpi xmlns:a14="http://schemas.microsoft.com/office/drawing/2010/main" val="0"/>
@@ -3351,7 +3510,7 @@
           <p:nvPr/>
         </p:nvPicPr>
         <p:blipFill>
-          <a:blip r:embed="rId4">
+          <a:blip r:embed="rId3">
             <a:extLst>
               <a:ext uri="{28A0092B-C50C-407E-A947-70E740481C1C}">
                 <a14:useLocalDpi xmlns:a14="http://schemas.microsoft.com/office/drawing/2010/main" val="0"/>
@@ -3381,7 +3540,7 @@
           <p:nvPr/>
         </p:nvPicPr>
         <p:blipFill>
-          <a:blip r:embed="rId5">
+          <a:blip r:embed="rId4">
             <a:extLst>
               <a:ext uri="{28A0092B-C50C-407E-A947-70E740481C1C}">
                 <a14:useLocalDpi xmlns:a14="http://schemas.microsoft.com/office/drawing/2010/main" val="0"/>
@@ -3501,6 +3660,36 @@
           </a:fontRef>
         </p:style>
       </p:cxnSp>
+      <p:pic>
+        <p:nvPicPr>
+          <p:cNvPr id="2" name="Picture 1" descr="Presenter:Judge Names.png"/>
+          <p:cNvPicPr>
+            <a:picLocks noChangeAspect="1"/>
+          </p:cNvPicPr>
+          <p:nvPr/>
+        </p:nvPicPr>
+        <p:blipFill>
+          <a:blip r:embed="rId5">
+            <a:extLst>
+              <a:ext uri="{28A0092B-C50C-407E-A947-70E740481C1C}">
+                <a14:useLocalDpi xmlns:a14="http://schemas.microsoft.com/office/drawing/2010/main" val="0"/>
+              </a:ext>
+            </a:extLst>
+          </a:blip>
+          <a:stretch>
+            <a:fillRect/>
+          </a:stretch>
+        </p:blipFill>
+        <p:spPr>
+          <a:xfrm>
+            <a:off x="137978" y="0"/>
+            <a:ext cx="3785536" cy="3737562"/>
+          </a:xfrm>
+          <a:prstGeom prst="rect">
+            <a:avLst/>
+          </a:prstGeom>
+        </p:spPr>
+      </p:pic>
     </p:spTree>
     <p:extLst>
       <p:ext uri="{BB962C8B-B14F-4D97-AF65-F5344CB8AC3E}">

</xml_diff>